<commit_message>
[MT M] Revisioni alla presentazione di Francesco
</commit_message>
<xml_diff>
--- a/Presentazione/Atsilo2/Durante/Atsilo_M_PresentazioneFinale.pptx
+++ b/Presentazione/Atsilo2/Durante/Atsilo_M_PresentazioneFinale.pptx
@@ -125,6 +125,83 @@
 </p:presentation>
 </file>
 
+<file path=ppt/commentAuthors.xml><?xml version="1.0" encoding="utf-8"?>
+<p:cmAuthorLst xmlns:a="http://schemas.openxmlformats.org/drawingml/2006/main" xmlns:r="http://schemas.openxmlformats.org/officeDocument/2006/relationships" xmlns:p="http://schemas.openxmlformats.org/presentationml/2006/main">
+  <p:cmAuthor id="0" name="Giulio" initials="GF" lastIdx="10" clrIdx="0"/>
+</p:cmAuthorLst>
+</file>
+
+<file path=ppt/comments/comment1.xml><?xml version="1.0" encoding="utf-8"?>
+<p:cmLst xmlns:a="http://schemas.openxmlformats.org/drawingml/2006/main" xmlns:r="http://schemas.openxmlformats.org/officeDocument/2006/relationships" xmlns:p="http://schemas.openxmlformats.org/presentationml/2006/main">
+  <p:cm authorId="0" dt="2012-12-30T13:42:20.156" idx="1">
+    <p:pos x="1265" y="2365"/>
+    <p:text>Degli attori del nostro sottosistema dovrebbe parlare già Luigi.
+Ad ogni modo, se possibile, usa una nuova immagine, con solo gli attori nostri. Questa qui è poco leggibile.</p:text>
+  </p:cm>
+</p:cmLst>
+</file>
+
+<file path=ppt/comments/comment2.xml><?xml version="1.0" encoding="utf-8"?>
+<p:cmLst xmlns:a="http://schemas.openxmlformats.org/drawingml/2006/main" xmlns:r="http://schemas.openxmlformats.org/officeDocument/2006/relationships" xmlns:p="http://schemas.openxmlformats.org/presentationml/2006/main">
+  <p:cm authorId="0" dt="2012-12-30T13:43:47.113" idx="2">
+    <p:pos x="10" y="10"/>
+    <p:text>Cerca di partire subito con un confronto diretto sui diagrammi dei casi d'uso, e poi passi al confronto sui casi d'uso veri e propri.</p:text>
+  </p:cm>
+</p:cmLst>
+</file>
+
+<file path=ppt/comments/comment3.xml><?xml version="1.0" encoding="utf-8"?>
+<p:cmLst xmlns:a="http://schemas.openxmlformats.org/drawingml/2006/main" xmlns:r="http://schemas.openxmlformats.org/officeDocument/2006/relationships" xmlns:p="http://schemas.openxmlformats.org/presentationml/2006/main">
+  <p:cm authorId="0" dt="2012-12-30T13:46:31.672" idx="3">
+    <p:pos x="10" y="10"/>
+    <p:text>E' buona l'idea di illustrare in pratica le funzionalità, però forse sarebbe più interessante se ci affiancassi i mockup, un sequence o anche la grafica finale.
+Inoltre, potresti far vedere a confronto due casi d'uso simili, prima e dopo.</p:text>
+  </p:cm>
+</p:cmLst>
+</file>
+
+<file path=ppt/comments/comment4.xml><?xml version="1.0" encoding="utf-8"?>
+<p:cmLst xmlns:a="http://schemas.openxmlformats.org/drawingml/2006/main" xmlns:r="http://schemas.openxmlformats.org/officeDocument/2006/relationships" xmlns:p="http://schemas.openxmlformats.org/presentationml/2006/main">
+  <p:cm authorId="0" dt="2012-12-30T13:48:06.710" idx="4">
+    <p:pos x="10" y="10"/>
+    <p:text>Dovresti scrivere, da qualche parte sulla slide, le informazioni di tracciabilità. Più in generale, questa slide dovrebbe stare vicino al caso d'uso o ai casi d'uso che rappresenta.</p:text>
+  </p:cm>
+</p:cmLst>
+</file>
+
+<file path=ppt/comments/comment5.xml><?xml version="1.0" encoding="utf-8"?>
+<p:cmLst xmlns:a="http://schemas.openxmlformats.org/drawingml/2006/main" xmlns:r="http://schemas.openxmlformats.org/officeDocument/2006/relationships" xmlns:p="http://schemas.openxmlformats.org/presentationml/2006/main">
+  <p:cm authorId="0" dt="2012-12-30T13:51:38.820" idx="6">
+    <p:pos x="2906" y="1909"/>
+    <p:text>Credo che qui dovresti esprimere le cose in un modo diverso. Fatto così, dici tutto e non dici niente...
+E' chiaro che è mancato il tempo, però forse dovresti includere qualche suggerimento su come si sarebbe potuto fare qualcosa di diverso.</p:text>
+  </p:cm>
+  <p:cm authorId="0" dt="2012-12-30T13:51:54.457" idx="7">
+    <p:pos x="10" y="10"/>
+    <p:text>Controlla la grammatica qui.
+La prof non te lo dice, ma ci fa caso.</p:text>
+  </p:cm>
+</p:cmLst>
+</file>
+
+<file path=ppt/comments/comment6.xml><?xml version="1.0" encoding="utf-8"?>
+<p:cmLst xmlns:a="http://schemas.openxmlformats.org/drawingml/2006/main" xmlns:r="http://schemas.openxmlformats.org/officeDocument/2006/relationships" xmlns:p="http://schemas.openxmlformats.org/presentationml/2006/main">
+  <p:cm authorId="0" dt="2012-12-30T13:52:24.075" idx="8">
+    <p:pos x="3662" y="1367"/>
+    <p:text>In realtà qui i Kids fanno meglio</p:text>
+  </p:cm>
+  <p:cm authorId="0" dt="2012-12-30T13:53:29.020" idx="9">
+    <p:pos x="5545" y="1883"/>
+    <p:text>Magari, potresti fare qualche slide, per giustificare questa affermazione, in cui fai vedere le checklist e i fogli di V&amp;V con relativi errori, e come questi errori sono stati corretti.</p:text>
+  </p:cm>
+  <p:cm authorId="0" dt="2012-12-30T13:55:16.680" idx="10">
+    <p:pos x="4969" y="2227"/>
+    <p:text>Anche qui, dovresti motivare la tua affermazione con qualche slide precedente, in cui fai vedere in pratica come questo si realizza.
+Se fai vedere la grafica finale, preparati anche alla domanda: "Non sarebbe stato meglio suddividere le funzionalità in categorie ed espanderle mano a mano? Come avete fatto voi può creare confusione, perché c'è un menù molto lungo"</p:text>
+  </p:cm>
+</p:cmLst>
+</file>
+
 <file path=ppt/notesMasters/notesMaster1.xml><?xml version="1.0" encoding="utf-8"?>
 <p:notesMaster xmlns:a="http://schemas.openxmlformats.org/drawingml/2006/main" xmlns:r="http://schemas.openxmlformats.org/officeDocument/2006/relationships" xmlns:p="http://schemas.openxmlformats.org/presentationml/2006/main">
   <p:cSld>
@@ -207,7 +284,8 @@
           <a:p>
             <a:fld id="{38D78F4D-402C-46E0-A4BB-DF91EA86B14C}" type="datetimeFigureOut">
               <a:rPr lang="it-IT" smtClean="0"/>
-              <a:t>29/12/2012</a:t>
+              <a:pPr/>
+              <a:t>30/12/2012</a:t>
             </a:fld>
             <a:endParaRPr lang="it-IT"/>
           </a:p>
@@ -366,6 +444,7 @@
           <a:p>
             <a:fld id="{D70604CA-7593-4640-8FA1-5523937B8510}" type="slidenum">
               <a:rPr lang="it-IT" smtClean="0"/>
+              <a:pPr/>
               <a:t>‹N›</a:t>
             </a:fld>
             <a:endParaRPr lang="it-IT"/>
@@ -375,7 +454,7 @@
     </p:spTree>
     <p:extLst>
       <p:ext uri="{BB962C8B-B14F-4D97-AF65-F5344CB8AC3E}">
-        <p14:creationId xmlns:p14="http://schemas.microsoft.com/office/powerpoint/2010/main" val="2126419590"/>
+        <p14:creationId xmlns:p14="http://schemas.microsoft.com/office/powerpoint/2010/main" xmlns="" val="2126419590"/>
       </p:ext>
     </p:extLst>
   </p:cSld>
@@ -640,7 +719,8 @@
           <a:p>
             <a:fld id="{63CABBC0-75E4-43BB-A6A6-84C2A96BDB82}" type="datetimeFigureOut">
               <a:rPr lang="it-IT" smtClean="0"/>
-              <a:t>29/12/2012</a:t>
+              <a:pPr/>
+              <a:t>30/12/2012</a:t>
             </a:fld>
             <a:endParaRPr lang="it-IT"/>
           </a:p>
@@ -682,6 +762,7 @@
           <a:p>
             <a:fld id="{F89AEA99-3E91-4C58-9AD4-045DB5619AC3}" type="slidenum">
               <a:rPr lang="it-IT" smtClean="0"/>
+              <a:pPr/>
               <a:t>‹N›</a:t>
             </a:fld>
             <a:endParaRPr lang="it-IT"/>
@@ -820,7 +901,8 @@
           <a:p>
             <a:fld id="{63CABBC0-75E4-43BB-A6A6-84C2A96BDB82}" type="datetimeFigureOut">
               <a:rPr lang="it-IT" smtClean="0"/>
-              <a:t>29/12/2012</a:t>
+              <a:pPr/>
+              <a:t>30/12/2012</a:t>
             </a:fld>
             <a:endParaRPr lang="it-IT"/>
           </a:p>
@@ -862,6 +944,7 @@
           <a:p>
             <a:fld id="{F89AEA99-3E91-4C58-9AD4-045DB5619AC3}" type="slidenum">
               <a:rPr lang="it-IT" smtClean="0"/>
+              <a:pPr/>
               <a:t>‹N›</a:t>
             </a:fld>
             <a:endParaRPr lang="it-IT"/>
@@ -1010,7 +1093,8 @@
           <a:p>
             <a:fld id="{63CABBC0-75E4-43BB-A6A6-84C2A96BDB82}" type="datetimeFigureOut">
               <a:rPr lang="it-IT" smtClean="0"/>
-              <a:t>29/12/2012</a:t>
+              <a:pPr/>
+              <a:t>30/12/2012</a:t>
             </a:fld>
             <a:endParaRPr lang="it-IT"/>
           </a:p>
@@ -1052,6 +1136,7 @@
           <a:p>
             <a:fld id="{F89AEA99-3E91-4C58-9AD4-045DB5619AC3}" type="slidenum">
               <a:rPr lang="it-IT" smtClean="0"/>
+              <a:pPr/>
               <a:t>‹N›</a:t>
             </a:fld>
             <a:endParaRPr lang="it-IT"/>
@@ -1190,7 +1275,8 @@
           <a:p>
             <a:fld id="{63CABBC0-75E4-43BB-A6A6-84C2A96BDB82}" type="datetimeFigureOut">
               <a:rPr lang="it-IT" smtClean="0"/>
-              <a:t>29/12/2012</a:t>
+              <a:pPr/>
+              <a:t>30/12/2012</a:t>
             </a:fld>
             <a:endParaRPr lang="it-IT"/>
           </a:p>
@@ -1232,6 +1318,7 @@
           <a:p>
             <a:fld id="{F89AEA99-3E91-4C58-9AD4-045DB5619AC3}" type="slidenum">
               <a:rPr lang="it-IT" smtClean="0"/>
+              <a:pPr/>
               <a:t>‹N›</a:t>
             </a:fld>
             <a:endParaRPr lang="it-IT"/>
@@ -1431,7 +1518,8 @@
           <a:p>
             <a:fld id="{63CABBC0-75E4-43BB-A6A6-84C2A96BDB82}" type="datetimeFigureOut">
               <a:rPr lang="it-IT" smtClean="0"/>
-              <a:t>29/12/2012</a:t>
+              <a:pPr/>
+              <a:t>30/12/2012</a:t>
             </a:fld>
             <a:endParaRPr lang="it-IT"/>
           </a:p>
@@ -1473,6 +1561,7 @@
           <a:p>
             <a:fld id="{F89AEA99-3E91-4C58-9AD4-045DB5619AC3}" type="slidenum">
               <a:rPr lang="it-IT" smtClean="0"/>
+              <a:pPr/>
               <a:t>‹N›</a:t>
             </a:fld>
             <a:endParaRPr lang="it-IT"/>
@@ -1710,7 +1799,8 @@
           <a:p>
             <a:fld id="{63CABBC0-75E4-43BB-A6A6-84C2A96BDB82}" type="datetimeFigureOut">
               <a:rPr lang="it-IT" smtClean="0"/>
-              <a:t>29/12/2012</a:t>
+              <a:pPr/>
+              <a:t>30/12/2012</a:t>
             </a:fld>
             <a:endParaRPr lang="it-IT"/>
           </a:p>
@@ -1752,6 +1842,7 @@
           <a:p>
             <a:fld id="{F89AEA99-3E91-4C58-9AD4-045DB5619AC3}" type="slidenum">
               <a:rPr lang="it-IT" smtClean="0"/>
+              <a:pPr/>
               <a:t>‹N›</a:t>
             </a:fld>
             <a:endParaRPr lang="it-IT"/>
@@ -2099,7 +2190,8 @@
           <a:p>
             <a:fld id="{63CABBC0-75E4-43BB-A6A6-84C2A96BDB82}" type="datetimeFigureOut">
               <a:rPr lang="it-IT" smtClean="0"/>
-              <a:t>29/12/2012</a:t>
+              <a:pPr/>
+              <a:t>30/12/2012</a:t>
             </a:fld>
             <a:endParaRPr lang="it-IT"/>
           </a:p>
@@ -2141,6 +2233,7 @@
           <a:p>
             <a:fld id="{F89AEA99-3E91-4C58-9AD4-045DB5619AC3}" type="slidenum">
               <a:rPr lang="it-IT" smtClean="0"/>
+              <a:pPr/>
               <a:t>‹N›</a:t>
             </a:fld>
             <a:endParaRPr lang="it-IT"/>
@@ -2256,7 +2349,8 @@
           <a:p>
             <a:fld id="{63CABBC0-75E4-43BB-A6A6-84C2A96BDB82}" type="datetimeFigureOut">
               <a:rPr lang="it-IT" smtClean="0"/>
-              <a:t>29/12/2012</a:t>
+              <a:pPr/>
+              <a:t>30/12/2012</a:t>
             </a:fld>
             <a:endParaRPr lang="it-IT"/>
           </a:p>
@@ -2298,6 +2392,7 @@
           <a:p>
             <a:fld id="{F89AEA99-3E91-4C58-9AD4-045DB5619AC3}" type="slidenum">
               <a:rPr lang="it-IT" smtClean="0"/>
+              <a:pPr/>
               <a:t>‹N›</a:t>
             </a:fld>
             <a:endParaRPr lang="it-IT"/>
@@ -2353,7 +2448,8 @@
           <a:p>
             <a:fld id="{63CABBC0-75E4-43BB-A6A6-84C2A96BDB82}" type="datetimeFigureOut">
               <a:rPr lang="it-IT" smtClean="0"/>
-              <a:t>29/12/2012</a:t>
+              <a:pPr/>
+              <a:t>30/12/2012</a:t>
             </a:fld>
             <a:endParaRPr lang="it-IT"/>
           </a:p>
@@ -2395,6 +2491,7 @@
           <a:p>
             <a:fld id="{F89AEA99-3E91-4C58-9AD4-045DB5619AC3}" type="slidenum">
               <a:rPr lang="it-IT" smtClean="0"/>
+              <a:pPr/>
               <a:t>‹N›</a:t>
             </a:fld>
             <a:endParaRPr lang="it-IT"/>
@@ -2621,7 +2718,8 @@
           <a:p>
             <a:fld id="{63CABBC0-75E4-43BB-A6A6-84C2A96BDB82}" type="datetimeFigureOut">
               <a:rPr lang="it-IT" smtClean="0"/>
-              <a:t>29/12/2012</a:t>
+              <a:pPr/>
+              <a:t>30/12/2012</a:t>
             </a:fld>
             <a:endParaRPr lang="it-IT"/>
           </a:p>
@@ -2663,6 +2761,7 @@
           <a:p>
             <a:fld id="{F89AEA99-3E91-4C58-9AD4-045DB5619AC3}" type="slidenum">
               <a:rPr lang="it-IT" smtClean="0"/>
+              <a:pPr/>
               <a:t>‹N›</a:t>
             </a:fld>
             <a:endParaRPr lang="it-IT"/>
@@ -2916,7 +3015,8 @@
           <a:p>
             <a:fld id="{63CABBC0-75E4-43BB-A6A6-84C2A96BDB82}" type="datetimeFigureOut">
               <a:rPr lang="it-IT" smtClean="0"/>
-              <a:t>29/12/2012</a:t>
+              <a:pPr/>
+              <a:t>30/12/2012</a:t>
             </a:fld>
             <a:endParaRPr lang="it-IT"/>
           </a:p>
@@ -2963,6 +3063,7 @@
           <a:p>
             <a:fld id="{F89AEA99-3E91-4C58-9AD4-045DB5619AC3}" type="slidenum">
               <a:rPr lang="it-IT" smtClean="0"/>
+              <a:pPr/>
               <a:t>‹N›</a:t>
             </a:fld>
             <a:endParaRPr lang="it-IT"/>
@@ -3694,7 +3795,8 @@
           <a:p>
             <a:fld id="{63CABBC0-75E4-43BB-A6A6-84C2A96BDB82}" type="datetimeFigureOut">
               <a:rPr lang="it-IT" smtClean="0"/>
-              <a:t>29/12/2012</a:t>
+              <a:pPr/>
+              <a:t>30/12/2012</a:t>
             </a:fld>
             <a:endParaRPr lang="it-IT"/>
           </a:p>
@@ -3772,6 +3874,7 @@
           <a:p>
             <a:fld id="{F89AEA99-3E91-4C58-9AD4-045DB5619AC3}" type="slidenum">
               <a:rPr lang="it-IT" smtClean="0"/>
+              <a:pPr/>
               <a:t>‹N›</a:t>
             </a:fld>
             <a:endParaRPr lang="it-IT"/>
@@ -4376,13 +4479,13 @@
           <p:nvPr>
             <p:extLst>
               <p:ext uri="{D42A27DB-BD31-4B8C-83A1-F6EECF244321}">
-                <p14:modId xmlns:p14="http://schemas.microsoft.com/office/powerpoint/2010/main" val="1266527793"/>
+                <p14:modId xmlns:p14="http://schemas.microsoft.com/office/powerpoint/2010/main" xmlns="" val="1266527793"/>
               </p:ext>
             </p:extLst>
           </p:nvPr>
         </p:nvGraphicFramePr>
         <p:xfrm>
-          <a:off x="29313" y="5042215"/>
+          <a:off x="179512" y="5517232"/>
           <a:ext cx="2051720" cy="1188720"/>
         </p:xfrm>
         <a:graphic>
@@ -4500,13 +4603,13 @@
           <p:nvPr>
             <p:extLst>
               <p:ext uri="{D42A27DB-BD31-4B8C-83A1-F6EECF244321}">
-                <p14:modId xmlns:p14="http://schemas.microsoft.com/office/powerpoint/2010/main" val="3696521689"/>
+                <p14:modId xmlns:p14="http://schemas.microsoft.com/office/powerpoint/2010/main" xmlns="" val="3696521689"/>
               </p:ext>
             </p:extLst>
           </p:nvPr>
         </p:nvGraphicFramePr>
         <p:xfrm>
-          <a:off x="7092280" y="6060793"/>
+          <a:off x="6876256" y="5877272"/>
           <a:ext cx="2051720" cy="792480"/>
         </p:xfrm>
         <a:graphic>
@@ -4587,10 +4690,10 @@
           <p:nvPr/>
         </p:nvPicPr>
         <p:blipFill>
-          <a:blip r:embed="rId2">
+          <a:blip r:embed="rId2" cstate="print">
             <a:extLst>
               <a:ext uri="{28A0092B-C50C-407E-A947-70E740481C1C}">
-                <a14:useLocalDpi xmlns:a14="http://schemas.microsoft.com/office/drawing/2010/main" val="0"/>
+                <a14:useLocalDpi xmlns:a14="http://schemas.microsoft.com/office/drawing/2010/main" xmlns="" val="0"/>
               </a:ext>
             </a:extLst>
           </a:blip>
@@ -4610,7 +4713,7 @@
           <a:noFill/>
           <a:extLst>
             <a:ext uri="{909E8E84-426E-40DD-AFC4-6F175D3DCCD1}">
-              <a14:hiddenFill xmlns:a14="http://schemas.microsoft.com/office/drawing/2010/main">
+              <a14:hiddenFill xmlns:a14="http://schemas.microsoft.com/office/drawing/2010/main" xmlns="">
                 <a:solidFill>
                   <a:srgbClr val="FFFFFF"/>
                 </a:solidFill>
@@ -4622,7 +4725,7 @@
     </p:spTree>
     <p:extLst>
       <p:ext uri="{BB962C8B-B14F-4D97-AF65-F5344CB8AC3E}">
-        <p14:creationId xmlns:p14="http://schemas.microsoft.com/office/powerpoint/2010/main" val="4165334171"/>
+        <p14:creationId xmlns:p14="http://schemas.microsoft.com/office/powerpoint/2010/main" xmlns="" val="4165334171"/>
       </p:ext>
     </p:extLst>
   </p:cSld>
@@ -4689,11 +4792,7 @@
             </a:r>
             <a:r>
               <a:rPr lang="it-IT" sz="4000" b="1" dirty="0" smtClean="0"/>
-              <a:t> </a:t>
-            </a:r>
-            <a:r>
-              <a:rPr lang="it-IT" sz="4000" b="1" dirty="0" smtClean="0"/>
-              <a:t>1 – RAD 4.0</a:t>
+              <a:t> 1 – RAD 4.0</a:t>
             </a:r>
             <a:endParaRPr lang="it-IT" sz="4000" dirty="0"/>
           </a:p>
@@ -4742,10 +4841,10 @@
           <p:nvPr/>
         </p:nvPicPr>
         <p:blipFill>
-          <a:blip r:embed="rId2">
+          <a:blip r:embed="rId2" cstate="print">
             <a:extLst>
               <a:ext uri="{28A0092B-C50C-407E-A947-70E740481C1C}">
-                <a14:useLocalDpi xmlns:a14="http://schemas.microsoft.com/office/drawing/2010/main" val="0"/>
+                <a14:useLocalDpi xmlns:a14="http://schemas.microsoft.com/office/drawing/2010/main" xmlns="" val="0"/>
               </a:ext>
             </a:extLst>
           </a:blip>
@@ -4800,7 +4899,7 @@
     </p:spTree>
     <p:extLst>
       <p:ext uri="{BB962C8B-B14F-4D97-AF65-F5344CB8AC3E}">
-        <p14:creationId xmlns:p14="http://schemas.microsoft.com/office/powerpoint/2010/main" val="247169405"/>
+        <p14:creationId xmlns:p14="http://schemas.microsoft.com/office/powerpoint/2010/main" xmlns="" val="247169405"/>
       </p:ext>
     </p:extLst>
   </p:cSld>
@@ -4867,11 +4966,7 @@
             </a:r>
             <a:r>
               <a:rPr lang="it-IT" sz="4000" b="1" dirty="0" smtClean="0"/>
-              <a:t> </a:t>
-            </a:r>
-            <a:r>
-              <a:rPr lang="it-IT" sz="4000" b="1" dirty="0" smtClean="0"/>
-              <a:t>2 – RAD 4.0</a:t>
+              <a:t> 2 – RAD 4.0</a:t>
             </a:r>
             <a:endParaRPr lang="it-IT" sz="4000" b="1" dirty="0"/>
           </a:p>
@@ -4886,10 +4981,10 @@
           <p:nvPr/>
         </p:nvPicPr>
         <p:blipFill>
-          <a:blip r:embed="rId2">
+          <a:blip r:embed="rId2" cstate="print">
             <a:extLst>
               <a:ext uri="{28A0092B-C50C-407E-A947-70E740481C1C}">
-                <a14:useLocalDpi xmlns:a14="http://schemas.microsoft.com/office/drawing/2010/main" val="0"/>
+                <a14:useLocalDpi xmlns:a14="http://schemas.microsoft.com/office/drawing/2010/main" xmlns="" val="0"/>
               </a:ext>
             </a:extLst>
           </a:blip>
@@ -4945,7 +5040,7 @@
     </p:spTree>
     <p:extLst>
       <p:ext uri="{BB962C8B-B14F-4D97-AF65-F5344CB8AC3E}">
-        <p14:creationId xmlns:p14="http://schemas.microsoft.com/office/powerpoint/2010/main" val="1376204328"/>
+        <p14:creationId xmlns:p14="http://schemas.microsoft.com/office/powerpoint/2010/main" xmlns="" val="1376204328"/>
       </p:ext>
     </p:extLst>
   </p:cSld>
@@ -5012,11 +5107,7 @@
             </a:r>
             <a:r>
               <a:rPr lang="it-IT" sz="4000" b="1" smtClean="0"/>
-              <a:t> </a:t>
-            </a:r>
-            <a:r>
-              <a:rPr lang="it-IT" sz="4000" b="1" smtClean="0"/>
-              <a:t>3 – RAD 4.0</a:t>
+              <a:t> 3 – RAD 4.0</a:t>
             </a:r>
             <a:endParaRPr lang="it-IT" sz="4000" b="1" dirty="0"/>
           </a:p>
@@ -5031,10 +5122,10 @@
           <p:nvPr/>
         </p:nvPicPr>
         <p:blipFill>
-          <a:blip r:embed="rId2">
+          <a:blip r:embed="rId2" cstate="print">
             <a:extLst>
               <a:ext uri="{28A0092B-C50C-407E-A947-70E740481C1C}">
-                <a14:useLocalDpi xmlns:a14="http://schemas.microsoft.com/office/drawing/2010/main" val="0"/>
+                <a14:useLocalDpi xmlns:a14="http://schemas.microsoft.com/office/drawing/2010/main" xmlns="" val="0"/>
               </a:ext>
             </a:extLst>
           </a:blip>
@@ -5093,7 +5184,7 @@
     </p:spTree>
     <p:extLst>
       <p:ext uri="{BB962C8B-B14F-4D97-AF65-F5344CB8AC3E}">
-        <p14:creationId xmlns:p14="http://schemas.microsoft.com/office/powerpoint/2010/main" val="1545582615"/>
+        <p14:creationId xmlns:p14="http://schemas.microsoft.com/office/powerpoint/2010/main" xmlns="" val="1545582615"/>
       </p:ext>
     </p:extLst>
   </p:cSld>
@@ -5168,10 +5259,10 @@
           <p:nvPr/>
         </p:nvPicPr>
         <p:blipFill>
-          <a:blip r:embed="rId2">
+          <a:blip r:embed="rId2" cstate="print">
             <a:extLst>
               <a:ext uri="{28A0092B-C50C-407E-A947-70E740481C1C}">
-                <a14:useLocalDpi xmlns:a14="http://schemas.microsoft.com/office/drawing/2010/main" val="0"/>
+                <a14:useLocalDpi xmlns:a14="http://schemas.microsoft.com/office/drawing/2010/main" xmlns="" val="0"/>
               </a:ext>
             </a:extLst>
           </a:blip>
@@ -5223,7 +5314,7 @@
     </p:spTree>
     <p:extLst>
       <p:ext uri="{BB962C8B-B14F-4D97-AF65-F5344CB8AC3E}">
-        <p14:creationId xmlns:p14="http://schemas.microsoft.com/office/powerpoint/2010/main" val="2535709406"/>
+        <p14:creationId xmlns:p14="http://schemas.microsoft.com/office/powerpoint/2010/main" xmlns="" val="2535709406"/>
       </p:ext>
     </p:extLst>
   </p:cSld>
@@ -5376,7 +5467,7 @@
     </p:spTree>
     <p:extLst>
       <p:ext uri="{BB962C8B-B14F-4D97-AF65-F5344CB8AC3E}">
-        <p14:creationId xmlns:p14="http://schemas.microsoft.com/office/powerpoint/2010/main" val="2176004432"/>
+        <p14:creationId xmlns:p14="http://schemas.microsoft.com/office/powerpoint/2010/main" xmlns="" val="2176004432"/>
       </p:ext>
     </p:extLst>
   </p:cSld>
@@ -5632,7 +5723,21 @@
                 <a:latin typeface="Arial" pitchFamily="34" charset="0"/>
                 <a:cs typeface="Arial" pitchFamily="34" charset="0"/>
               </a:rPr>
-              <a:t> traumatico, ma una volta che si ha preso confidenza con gli strumenti in nostro possesso poi è stato tutto più facile e rapido. Per le problematiche spiegate in precedenza e per la mancanza di tempo necessario, tutto il lavoro su l’individuazione degli attori, con annesso tutte le difficoltà sul capire bene i requisiti da adottare, poteva essere fatta in modo migliore.</a:t>
+              <a:t> traumatico, ma una volta </a:t>
+            </a:r>
+            <a:r>
+              <a:rPr lang="it-IT" dirty="0" smtClean="0">
+                <a:latin typeface="Arial" pitchFamily="34" charset="0"/>
+                <a:cs typeface="Arial" pitchFamily="34" charset="0"/>
+              </a:rPr>
+              <a:t>che si ha preso confidenza </a:t>
+            </a:r>
+            <a:r>
+              <a:rPr lang="it-IT" dirty="0" smtClean="0">
+                <a:latin typeface="Arial" pitchFamily="34" charset="0"/>
+                <a:cs typeface="Arial" pitchFamily="34" charset="0"/>
+              </a:rPr>
+              <a:t>con gli strumenti in nostro possesso poi è stato tutto più facile e rapido. Per le problematiche spiegate in precedenza e per la mancanza di tempo necessario, tutto il lavoro su l’individuazione degli attori, con annesso tutte le difficoltà sul capire bene i requisiti da adottare, poteva essere fatta in modo migliore.</a:t>
             </a:r>
             <a:endParaRPr lang="it-IT" dirty="0"/>
           </a:p>
@@ -5641,7 +5746,7 @@
     </p:spTree>
     <p:extLst>
       <p:ext uri="{BB962C8B-B14F-4D97-AF65-F5344CB8AC3E}">
-        <p14:creationId xmlns:p14="http://schemas.microsoft.com/office/powerpoint/2010/main" val="957313322"/>
+        <p14:creationId xmlns:p14="http://schemas.microsoft.com/office/powerpoint/2010/main" xmlns="" val="957313322"/>
       </p:ext>
     </p:extLst>
   </p:cSld>
@@ -5769,13 +5874,8 @@
             </a:pPr>
             <a:r>
               <a:rPr lang="it-IT" dirty="0" smtClean="0"/>
-              <a:t>Perché scegliere @silo, perché è stato pensato anche per un utente poco esperto, che non vuole perdere tempo nel cercare quello che vuole, perché con pochi click può fare tutto </a:t>
-            </a:r>
-            <a:r>
-              <a:rPr lang="it-IT" smtClean="0"/>
-              <a:t>quello che deve fare.</a:t>
-            </a:r>
-            <a:endParaRPr lang="it-IT" dirty="0" smtClean="0"/>
+              <a:t>Perché scegliere @silo, perché è stato pensato anche per un utente poco esperto, che non vuole perdere tempo nel cercare quello che vuole, perché con pochi click può fare tutto quello che deve fare.</a:t>
+            </a:r>
           </a:p>
           <a:p>
             <a:r>
@@ -5792,7 +5892,7 @@
     </p:spTree>
     <p:extLst>
       <p:ext uri="{BB962C8B-B14F-4D97-AF65-F5344CB8AC3E}">
-        <p14:creationId xmlns:p14="http://schemas.microsoft.com/office/powerpoint/2010/main" val="2314765427"/>
+        <p14:creationId xmlns:p14="http://schemas.microsoft.com/office/powerpoint/2010/main" xmlns="" val="2314765427"/>
       </p:ext>
     </p:extLst>
   </p:cSld>
@@ -6345,18 +6445,18 @@
     </p:spTree>
     <p:extLst>
       <p:ext uri="{BB962C8B-B14F-4D97-AF65-F5344CB8AC3E}">
-        <p14:creationId xmlns:p14="http://schemas.microsoft.com/office/powerpoint/2010/main" val="155874689"/>
+        <p14:creationId xmlns:p14="http://schemas.microsoft.com/office/powerpoint/2010/main" xmlns="" val="155874689"/>
       </p:ext>
     </p:extLst>
   </p:cSld>
   <p:clrMapOvr>
     <a:masterClrMapping/>
   </p:clrMapOvr>
-  <mc:AlternateContent xmlns:mc="http://schemas.openxmlformats.org/markup-compatibility/2006" xmlns:p14="http://schemas.microsoft.com/office/powerpoint/2010/main">
-    <mc:Choice Requires="p14">
+  <mc:AlternateContent xmlns:mc="http://schemas.openxmlformats.org/markup-compatibility/2006">
+    <mc:Choice xmlns:p14="http://schemas.microsoft.com/office/powerpoint/2010/main" xmlns="" Requires="p14">
       <p:transition spd="slow" p14:dur="2000"/>
     </mc:Choice>
-    <mc:Fallback xmlns="">
+    <mc:Fallback>
       <p:transition spd="slow"/>
     </mc:Fallback>
   </mc:AlternateContent>
@@ -6427,10 +6527,10 @@
           <p:nvPr/>
         </p:nvPicPr>
         <p:blipFill>
-          <a:blip r:embed="rId2">
+          <a:blip r:embed="rId2" cstate="print">
             <a:extLst>
               <a:ext uri="{28A0092B-C50C-407E-A947-70E740481C1C}">
-                <a14:useLocalDpi xmlns:a14="http://schemas.microsoft.com/office/drawing/2010/main" val="0"/>
+                <a14:useLocalDpi xmlns:a14="http://schemas.microsoft.com/office/drawing/2010/main" xmlns="" val="0"/>
               </a:ext>
             </a:extLst>
           </a:blip>
@@ -6451,7 +6551,7 @@
     </p:spTree>
     <p:extLst>
       <p:ext uri="{BB962C8B-B14F-4D97-AF65-F5344CB8AC3E}">
-        <p14:creationId xmlns:p14="http://schemas.microsoft.com/office/powerpoint/2010/main" val="1421053857"/>
+        <p14:creationId xmlns:p14="http://schemas.microsoft.com/office/powerpoint/2010/main" xmlns="" val="1421053857"/>
       </p:ext>
     </p:extLst>
   </p:cSld>
@@ -6557,7 +6657,7 @@
     </p:spTree>
     <p:extLst>
       <p:ext uri="{BB962C8B-B14F-4D97-AF65-F5344CB8AC3E}">
-        <p14:creationId xmlns:p14="http://schemas.microsoft.com/office/powerpoint/2010/main" val="966444375"/>
+        <p14:creationId xmlns:p14="http://schemas.microsoft.com/office/powerpoint/2010/main" xmlns="" val="966444375"/>
       </p:ext>
     </p:extLst>
   </p:cSld>
@@ -6661,7 +6761,7 @@
     </p:spTree>
     <p:extLst>
       <p:ext uri="{BB962C8B-B14F-4D97-AF65-F5344CB8AC3E}">
-        <p14:creationId xmlns:p14="http://schemas.microsoft.com/office/powerpoint/2010/main" val="2537338845"/>
+        <p14:creationId xmlns:p14="http://schemas.microsoft.com/office/powerpoint/2010/main" xmlns="" val="2537338845"/>
       </p:ext>
     </p:extLst>
   </p:cSld>
@@ -6743,10 +6843,10 @@
           <p:nvPr/>
         </p:nvPicPr>
         <p:blipFill>
-          <a:blip r:embed="rId2">
+          <a:blip r:embed="rId2" cstate="print">
             <a:extLst>
               <a:ext uri="{28A0092B-C50C-407E-A947-70E740481C1C}">
-                <a14:useLocalDpi xmlns:a14="http://schemas.microsoft.com/office/drawing/2010/main" val="0"/>
+                <a14:useLocalDpi xmlns:a14="http://schemas.microsoft.com/office/drawing/2010/main" xmlns="" val="0"/>
               </a:ext>
             </a:extLst>
           </a:blip>
@@ -6767,7 +6867,7 @@
     </p:spTree>
     <p:extLst>
       <p:ext uri="{BB962C8B-B14F-4D97-AF65-F5344CB8AC3E}">
-        <p14:creationId xmlns:p14="http://schemas.microsoft.com/office/powerpoint/2010/main" val="1296864160"/>
+        <p14:creationId xmlns:p14="http://schemas.microsoft.com/office/powerpoint/2010/main" xmlns="" val="1296864160"/>
       </p:ext>
     </p:extLst>
   </p:cSld>
@@ -6844,10 +6944,10 @@
           <p:nvPr/>
         </p:nvPicPr>
         <p:blipFill>
-          <a:blip r:embed="rId2">
+          <a:blip r:embed="rId2" cstate="print">
             <a:extLst>
               <a:ext uri="{28A0092B-C50C-407E-A947-70E740481C1C}">
-                <a14:useLocalDpi xmlns:a14="http://schemas.microsoft.com/office/drawing/2010/main" val="0"/>
+                <a14:useLocalDpi xmlns:a14="http://schemas.microsoft.com/office/drawing/2010/main" xmlns="" val="0"/>
               </a:ext>
             </a:extLst>
           </a:blip>
@@ -6868,7 +6968,7 @@
     </p:spTree>
     <p:extLst>
       <p:ext uri="{BB962C8B-B14F-4D97-AF65-F5344CB8AC3E}">
-        <p14:creationId xmlns:p14="http://schemas.microsoft.com/office/powerpoint/2010/main" val="4136420094"/>
+        <p14:creationId xmlns:p14="http://schemas.microsoft.com/office/powerpoint/2010/main" xmlns="" val="4136420094"/>
       </p:ext>
     </p:extLst>
   </p:cSld>
@@ -7052,7 +7152,7 @@
     </p:spTree>
     <p:extLst>
       <p:ext uri="{BB962C8B-B14F-4D97-AF65-F5344CB8AC3E}">
-        <p14:creationId xmlns:p14="http://schemas.microsoft.com/office/powerpoint/2010/main" val="529095658"/>
+        <p14:creationId xmlns:p14="http://schemas.microsoft.com/office/powerpoint/2010/main" xmlns="" val="529095658"/>
       </p:ext>
     </p:extLst>
   </p:cSld>
@@ -7134,10 +7234,10 @@
           <p:nvPr/>
         </p:nvPicPr>
         <p:blipFill>
-          <a:blip r:embed="rId2">
+          <a:blip r:embed="rId2" cstate="print">
             <a:extLst>
               <a:ext uri="{28A0092B-C50C-407E-A947-70E740481C1C}">
-                <a14:useLocalDpi xmlns:a14="http://schemas.microsoft.com/office/drawing/2010/main" val="0"/>
+                <a14:useLocalDpi xmlns:a14="http://schemas.microsoft.com/office/drawing/2010/main" xmlns="" val="0"/>
               </a:ext>
             </a:extLst>
           </a:blip>
@@ -7193,7 +7293,7 @@
     </p:spTree>
     <p:extLst>
       <p:ext uri="{BB962C8B-B14F-4D97-AF65-F5344CB8AC3E}">
-        <p14:creationId xmlns:p14="http://schemas.microsoft.com/office/powerpoint/2010/main" val="422123805"/>
+        <p14:creationId xmlns:p14="http://schemas.microsoft.com/office/powerpoint/2010/main" xmlns="" val="422123805"/>
       </p:ext>
     </p:extLst>
   </p:cSld>

</xml_diff>

<commit_message>
[MT M] Revisioni alla presentazione di Francesco e Marco
</commit_message>
<xml_diff>
--- a/Presentazione/Atsilo2/Durante/Atsilo_M_PresentazioneFinale.pptx
+++ b/Presentazione/Atsilo2/Durante/Atsilo_M_PresentazioneFinale.pptx
@@ -127,7 +127,7 @@
 
 <file path=ppt/commentAuthors.xml><?xml version="1.0" encoding="utf-8"?>
 <p:cmAuthorLst xmlns:a="http://schemas.openxmlformats.org/drawingml/2006/main" xmlns:r="http://schemas.openxmlformats.org/officeDocument/2006/relationships" xmlns:p="http://schemas.openxmlformats.org/presentationml/2006/main">
-  <p:cmAuthor id="0" name="Giulio" initials="GF" lastIdx="10" clrIdx="0"/>
+  <p:cmAuthor id="0" name="Giulio" initials="GF" lastIdx="11" clrIdx="0"/>
 </p:cmAuthorLst>
 </file>
 
@@ -143,6 +143,16 @@
 
 <file path=ppt/comments/comment2.xml><?xml version="1.0" encoding="utf-8"?>
 <p:cmLst xmlns:a="http://schemas.openxmlformats.org/drawingml/2006/main" xmlns:r="http://schemas.openxmlformats.org/officeDocument/2006/relationships" xmlns:p="http://schemas.openxmlformats.org/presentationml/2006/main">
+  <p:cm authorId="0" dt="2012-12-30T15:13:57.837" idx="11">
+    <p:pos x="10" y="10"/>
+    <p:text>Ti consiglio di ispirarti alla slide di Marco, che ha messo proprio i requisiti funzionali presi dal RAD.
+Questa parte qui ti conviene comunque metterla, perché spiega perché stai parlando di questo.</p:text>
+  </p:cm>
+</p:cmLst>
+</file>
+
+<file path=ppt/comments/comment3.xml><?xml version="1.0" encoding="utf-8"?>
+<p:cmLst xmlns:a="http://schemas.openxmlformats.org/drawingml/2006/main" xmlns:r="http://schemas.openxmlformats.org/officeDocument/2006/relationships" xmlns:p="http://schemas.openxmlformats.org/presentationml/2006/main">
   <p:cm authorId="0" dt="2012-12-30T13:43:47.113" idx="2">
     <p:pos x="10" y="10"/>
     <p:text>Cerca di partire subito con un confronto diretto sui diagrammi dei casi d'uso, e poi passi al confronto sui casi d'uso veri e propri.</p:text>
@@ -150,7 +160,7 @@
 </p:cmLst>
 </file>
 
-<file path=ppt/comments/comment3.xml><?xml version="1.0" encoding="utf-8"?>
+<file path=ppt/comments/comment4.xml><?xml version="1.0" encoding="utf-8"?>
 <p:cmLst xmlns:a="http://schemas.openxmlformats.org/drawingml/2006/main" xmlns:r="http://schemas.openxmlformats.org/officeDocument/2006/relationships" xmlns:p="http://schemas.openxmlformats.org/presentationml/2006/main">
   <p:cm authorId="0" dt="2012-12-30T13:46:31.672" idx="3">
     <p:pos x="10" y="10"/>
@@ -160,7 +170,7 @@
 </p:cmLst>
 </file>
 
-<file path=ppt/comments/comment4.xml><?xml version="1.0" encoding="utf-8"?>
+<file path=ppt/comments/comment5.xml><?xml version="1.0" encoding="utf-8"?>
 <p:cmLst xmlns:a="http://schemas.openxmlformats.org/drawingml/2006/main" xmlns:r="http://schemas.openxmlformats.org/officeDocument/2006/relationships" xmlns:p="http://schemas.openxmlformats.org/presentationml/2006/main">
   <p:cm authorId="0" dt="2012-12-30T13:48:06.710" idx="4">
     <p:pos x="10" y="10"/>
@@ -169,7 +179,7 @@
 </p:cmLst>
 </file>
 
-<file path=ppt/comments/comment5.xml><?xml version="1.0" encoding="utf-8"?>
+<file path=ppt/comments/comment6.xml><?xml version="1.0" encoding="utf-8"?>
 <p:cmLst xmlns:a="http://schemas.openxmlformats.org/drawingml/2006/main" xmlns:r="http://schemas.openxmlformats.org/officeDocument/2006/relationships" xmlns:p="http://schemas.openxmlformats.org/presentationml/2006/main">
   <p:cm authorId="0" dt="2012-12-30T13:51:38.820" idx="6">
     <p:pos x="2906" y="1909"/>
@@ -184,7 +194,7 @@
 </p:cmLst>
 </file>
 
-<file path=ppt/comments/comment6.xml><?xml version="1.0" encoding="utf-8"?>
+<file path=ppt/comments/comment7.xml><?xml version="1.0" encoding="utf-8"?>
 <p:cmLst xmlns:a="http://schemas.openxmlformats.org/drawingml/2006/main" xmlns:r="http://schemas.openxmlformats.org/officeDocument/2006/relationships" xmlns:p="http://schemas.openxmlformats.org/presentationml/2006/main">
   <p:cm authorId="0" dt="2012-12-30T13:52:24.075" idx="8">
     <p:pos x="3662" y="1367"/>
@@ -454,7 +464,7 @@
     </p:spTree>
     <p:extLst>
       <p:ext uri="{BB962C8B-B14F-4D97-AF65-F5344CB8AC3E}">
-        <p14:creationId xmlns:p14="http://schemas.microsoft.com/office/powerpoint/2010/main" xmlns="" val="2126419590"/>
+        <p14:creationId xmlns="" xmlns:p14="http://schemas.microsoft.com/office/powerpoint/2010/main" val="2126419590"/>
       </p:ext>
     </p:extLst>
   </p:cSld>
@@ -4479,7 +4489,7 @@
           <p:nvPr>
             <p:extLst>
               <p:ext uri="{D42A27DB-BD31-4B8C-83A1-F6EECF244321}">
-                <p14:modId xmlns:p14="http://schemas.microsoft.com/office/powerpoint/2010/main" xmlns="" val="1266527793"/>
+                <p14:modId xmlns="" xmlns:p14="http://schemas.microsoft.com/office/powerpoint/2010/main" val="1266527793"/>
               </p:ext>
             </p:extLst>
           </p:nvPr>
@@ -4603,7 +4613,7 @@
           <p:nvPr>
             <p:extLst>
               <p:ext uri="{D42A27DB-BD31-4B8C-83A1-F6EECF244321}">
-                <p14:modId xmlns:p14="http://schemas.microsoft.com/office/powerpoint/2010/main" xmlns="" val="3696521689"/>
+                <p14:modId xmlns="" xmlns:p14="http://schemas.microsoft.com/office/powerpoint/2010/main" val="3696521689"/>
               </p:ext>
             </p:extLst>
           </p:nvPr>
@@ -4693,7 +4703,7 @@
           <a:blip r:embed="rId2" cstate="print">
             <a:extLst>
               <a:ext uri="{28A0092B-C50C-407E-A947-70E740481C1C}">
-                <a14:useLocalDpi xmlns:a14="http://schemas.microsoft.com/office/drawing/2010/main" xmlns="" val="0"/>
+                <a14:useLocalDpi xmlns="" xmlns:a14="http://schemas.microsoft.com/office/drawing/2010/main" val="0"/>
               </a:ext>
             </a:extLst>
           </a:blip>
@@ -4713,7 +4723,7 @@
           <a:noFill/>
           <a:extLst>
             <a:ext uri="{909E8E84-426E-40DD-AFC4-6F175D3DCCD1}">
-              <a14:hiddenFill xmlns:a14="http://schemas.microsoft.com/office/drawing/2010/main" xmlns="">
+              <a14:hiddenFill xmlns="" xmlns:a14="http://schemas.microsoft.com/office/drawing/2010/main">
                 <a:solidFill>
                   <a:srgbClr val="FFFFFF"/>
                 </a:solidFill>
@@ -4725,7 +4735,7 @@
     </p:spTree>
     <p:extLst>
       <p:ext uri="{BB962C8B-B14F-4D97-AF65-F5344CB8AC3E}">
-        <p14:creationId xmlns:p14="http://schemas.microsoft.com/office/powerpoint/2010/main" xmlns="" val="4165334171"/>
+        <p14:creationId xmlns="" xmlns:p14="http://schemas.microsoft.com/office/powerpoint/2010/main" val="4165334171"/>
       </p:ext>
     </p:extLst>
   </p:cSld>
@@ -4844,7 +4854,7 @@
           <a:blip r:embed="rId2" cstate="print">
             <a:extLst>
               <a:ext uri="{28A0092B-C50C-407E-A947-70E740481C1C}">
-                <a14:useLocalDpi xmlns:a14="http://schemas.microsoft.com/office/drawing/2010/main" xmlns="" val="0"/>
+                <a14:useLocalDpi xmlns="" xmlns:a14="http://schemas.microsoft.com/office/drawing/2010/main" val="0"/>
               </a:ext>
             </a:extLst>
           </a:blip>
@@ -4899,7 +4909,7 @@
     </p:spTree>
     <p:extLst>
       <p:ext uri="{BB962C8B-B14F-4D97-AF65-F5344CB8AC3E}">
-        <p14:creationId xmlns:p14="http://schemas.microsoft.com/office/powerpoint/2010/main" xmlns="" val="247169405"/>
+        <p14:creationId xmlns="" xmlns:p14="http://schemas.microsoft.com/office/powerpoint/2010/main" val="247169405"/>
       </p:ext>
     </p:extLst>
   </p:cSld>
@@ -4984,7 +4994,7 @@
           <a:blip r:embed="rId2" cstate="print">
             <a:extLst>
               <a:ext uri="{28A0092B-C50C-407E-A947-70E740481C1C}">
-                <a14:useLocalDpi xmlns:a14="http://schemas.microsoft.com/office/drawing/2010/main" xmlns="" val="0"/>
+                <a14:useLocalDpi xmlns="" xmlns:a14="http://schemas.microsoft.com/office/drawing/2010/main" val="0"/>
               </a:ext>
             </a:extLst>
           </a:blip>
@@ -5040,7 +5050,7 @@
     </p:spTree>
     <p:extLst>
       <p:ext uri="{BB962C8B-B14F-4D97-AF65-F5344CB8AC3E}">
-        <p14:creationId xmlns:p14="http://schemas.microsoft.com/office/powerpoint/2010/main" xmlns="" val="1376204328"/>
+        <p14:creationId xmlns="" xmlns:p14="http://schemas.microsoft.com/office/powerpoint/2010/main" val="1376204328"/>
       </p:ext>
     </p:extLst>
   </p:cSld>
@@ -5125,7 +5135,7 @@
           <a:blip r:embed="rId2" cstate="print">
             <a:extLst>
               <a:ext uri="{28A0092B-C50C-407E-A947-70E740481C1C}">
-                <a14:useLocalDpi xmlns:a14="http://schemas.microsoft.com/office/drawing/2010/main" xmlns="" val="0"/>
+                <a14:useLocalDpi xmlns="" xmlns:a14="http://schemas.microsoft.com/office/drawing/2010/main" val="0"/>
               </a:ext>
             </a:extLst>
           </a:blip>
@@ -5184,7 +5194,7 @@
     </p:spTree>
     <p:extLst>
       <p:ext uri="{BB962C8B-B14F-4D97-AF65-F5344CB8AC3E}">
-        <p14:creationId xmlns:p14="http://schemas.microsoft.com/office/powerpoint/2010/main" xmlns="" val="1545582615"/>
+        <p14:creationId xmlns="" xmlns:p14="http://schemas.microsoft.com/office/powerpoint/2010/main" val="1545582615"/>
       </p:ext>
     </p:extLst>
   </p:cSld>
@@ -5262,7 +5272,7 @@
           <a:blip r:embed="rId2" cstate="print">
             <a:extLst>
               <a:ext uri="{28A0092B-C50C-407E-A947-70E740481C1C}">
-                <a14:useLocalDpi xmlns:a14="http://schemas.microsoft.com/office/drawing/2010/main" xmlns="" val="0"/>
+                <a14:useLocalDpi xmlns="" xmlns:a14="http://schemas.microsoft.com/office/drawing/2010/main" val="0"/>
               </a:ext>
             </a:extLst>
           </a:blip>
@@ -5314,7 +5324,7 @@
     </p:spTree>
     <p:extLst>
       <p:ext uri="{BB962C8B-B14F-4D97-AF65-F5344CB8AC3E}">
-        <p14:creationId xmlns:p14="http://schemas.microsoft.com/office/powerpoint/2010/main" xmlns="" val="2535709406"/>
+        <p14:creationId xmlns="" xmlns:p14="http://schemas.microsoft.com/office/powerpoint/2010/main" val="2535709406"/>
       </p:ext>
     </p:extLst>
   </p:cSld>
@@ -5467,7 +5477,7 @@
     </p:spTree>
     <p:extLst>
       <p:ext uri="{BB962C8B-B14F-4D97-AF65-F5344CB8AC3E}">
-        <p14:creationId xmlns:p14="http://schemas.microsoft.com/office/powerpoint/2010/main" xmlns="" val="2176004432"/>
+        <p14:creationId xmlns="" xmlns:p14="http://schemas.microsoft.com/office/powerpoint/2010/main" val="2176004432"/>
       </p:ext>
     </p:extLst>
   </p:cSld>
@@ -5723,21 +5733,7 @@
                 <a:latin typeface="Arial" pitchFamily="34" charset="0"/>
                 <a:cs typeface="Arial" pitchFamily="34" charset="0"/>
               </a:rPr>
-              <a:t> traumatico, ma una volta </a:t>
-            </a:r>
-            <a:r>
-              <a:rPr lang="it-IT" dirty="0" smtClean="0">
-                <a:latin typeface="Arial" pitchFamily="34" charset="0"/>
-                <a:cs typeface="Arial" pitchFamily="34" charset="0"/>
-              </a:rPr>
-              <a:t>che si ha preso confidenza </a:t>
-            </a:r>
-            <a:r>
-              <a:rPr lang="it-IT" dirty="0" smtClean="0">
-                <a:latin typeface="Arial" pitchFamily="34" charset="0"/>
-                <a:cs typeface="Arial" pitchFamily="34" charset="0"/>
-              </a:rPr>
-              <a:t>con gli strumenti in nostro possesso poi è stato tutto più facile e rapido. Per le problematiche spiegate in precedenza e per la mancanza di tempo necessario, tutto il lavoro su l’individuazione degli attori, con annesso tutte le difficoltà sul capire bene i requisiti da adottare, poteva essere fatta in modo migliore.</a:t>
+              <a:t> traumatico, ma una volta che si ha preso confidenza con gli strumenti in nostro possesso poi è stato tutto più facile e rapido. Per le problematiche spiegate in precedenza e per la mancanza di tempo necessario, tutto il lavoro su l’individuazione degli attori, con annesso tutte le difficoltà sul capire bene i requisiti da adottare, poteva essere fatta in modo migliore.</a:t>
             </a:r>
             <a:endParaRPr lang="it-IT" dirty="0"/>
           </a:p>
@@ -5746,7 +5742,7 @@
     </p:spTree>
     <p:extLst>
       <p:ext uri="{BB962C8B-B14F-4D97-AF65-F5344CB8AC3E}">
-        <p14:creationId xmlns:p14="http://schemas.microsoft.com/office/powerpoint/2010/main" xmlns="" val="957313322"/>
+        <p14:creationId xmlns="" xmlns:p14="http://schemas.microsoft.com/office/powerpoint/2010/main" val="957313322"/>
       </p:ext>
     </p:extLst>
   </p:cSld>
@@ -5892,7 +5888,7 @@
     </p:spTree>
     <p:extLst>
       <p:ext uri="{BB962C8B-B14F-4D97-AF65-F5344CB8AC3E}">
-        <p14:creationId xmlns:p14="http://schemas.microsoft.com/office/powerpoint/2010/main" xmlns="" val="2314765427"/>
+        <p14:creationId xmlns="" xmlns:p14="http://schemas.microsoft.com/office/powerpoint/2010/main" val="2314765427"/>
       </p:ext>
     </p:extLst>
   </p:cSld>
@@ -6445,7 +6441,7 @@
     </p:spTree>
     <p:extLst>
       <p:ext uri="{BB962C8B-B14F-4D97-AF65-F5344CB8AC3E}">
-        <p14:creationId xmlns:p14="http://schemas.microsoft.com/office/powerpoint/2010/main" xmlns="" val="155874689"/>
+        <p14:creationId xmlns="" xmlns:p14="http://schemas.microsoft.com/office/powerpoint/2010/main" val="155874689"/>
       </p:ext>
     </p:extLst>
   </p:cSld>
@@ -6453,7 +6449,7 @@
     <a:masterClrMapping/>
   </p:clrMapOvr>
   <mc:AlternateContent xmlns:mc="http://schemas.openxmlformats.org/markup-compatibility/2006">
-    <mc:Choice xmlns:p14="http://schemas.microsoft.com/office/powerpoint/2010/main" xmlns="" Requires="p14">
+    <mc:Choice xmlns="" xmlns:p14="http://schemas.microsoft.com/office/powerpoint/2010/main" Requires="p14">
       <p:transition spd="slow" p14:dur="2000"/>
     </mc:Choice>
     <mc:Fallback>
@@ -6530,7 +6526,7 @@
           <a:blip r:embed="rId2" cstate="print">
             <a:extLst>
               <a:ext uri="{28A0092B-C50C-407E-A947-70E740481C1C}">
-                <a14:useLocalDpi xmlns:a14="http://schemas.microsoft.com/office/drawing/2010/main" xmlns="" val="0"/>
+                <a14:useLocalDpi xmlns="" xmlns:a14="http://schemas.microsoft.com/office/drawing/2010/main" val="0"/>
               </a:ext>
             </a:extLst>
           </a:blip>
@@ -6551,7 +6547,7 @@
     </p:spTree>
     <p:extLst>
       <p:ext uri="{BB962C8B-B14F-4D97-AF65-F5344CB8AC3E}">
-        <p14:creationId xmlns:p14="http://schemas.microsoft.com/office/powerpoint/2010/main" xmlns="" val="1421053857"/>
+        <p14:creationId xmlns="" xmlns:p14="http://schemas.microsoft.com/office/powerpoint/2010/main" val="1421053857"/>
       </p:ext>
     </p:extLst>
   </p:cSld>
@@ -6657,7 +6653,7 @@
     </p:spTree>
     <p:extLst>
       <p:ext uri="{BB962C8B-B14F-4D97-AF65-F5344CB8AC3E}">
-        <p14:creationId xmlns:p14="http://schemas.microsoft.com/office/powerpoint/2010/main" xmlns="" val="966444375"/>
+        <p14:creationId xmlns="" xmlns:p14="http://schemas.microsoft.com/office/powerpoint/2010/main" val="966444375"/>
       </p:ext>
     </p:extLst>
   </p:cSld>
@@ -6761,7 +6757,7 @@
     </p:spTree>
     <p:extLst>
       <p:ext uri="{BB962C8B-B14F-4D97-AF65-F5344CB8AC3E}">
-        <p14:creationId xmlns:p14="http://schemas.microsoft.com/office/powerpoint/2010/main" xmlns="" val="2537338845"/>
+        <p14:creationId xmlns="" xmlns:p14="http://schemas.microsoft.com/office/powerpoint/2010/main" val="2537338845"/>
       </p:ext>
     </p:extLst>
   </p:cSld>
@@ -6846,7 +6842,7 @@
           <a:blip r:embed="rId2" cstate="print">
             <a:extLst>
               <a:ext uri="{28A0092B-C50C-407E-A947-70E740481C1C}">
-                <a14:useLocalDpi xmlns:a14="http://schemas.microsoft.com/office/drawing/2010/main" xmlns="" val="0"/>
+                <a14:useLocalDpi xmlns="" xmlns:a14="http://schemas.microsoft.com/office/drawing/2010/main" val="0"/>
               </a:ext>
             </a:extLst>
           </a:blip>
@@ -6867,7 +6863,7 @@
     </p:spTree>
     <p:extLst>
       <p:ext uri="{BB962C8B-B14F-4D97-AF65-F5344CB8AC3E}">
-        <p14:creationId xmlns:p14="http://schemas.microsoft.com/office/powerpoint/2010/main" xmlns="" val="1296864160"/>
+        <p14:creationId xmlns="" xmlns:p14="http://schemas.microsoft.com/office/powerpoint/2010/main" val="1296864160"/>
       </p:ext>
     </p:extLst>
   </p:cSld>
@@ -6947,7 +6943,7 @@
           <a:blip r:embed="rId2" cstate="print">
             <a:extLst>
               <a:ext uri="{28A0092B-C50C-407E-A947-70E740481C1C}">
-                <a14:useLocalDpi xmlns:a14="http://schemas.microsoft.com/office/drawing/2010/main" xmlns="" val="0"/>
+                <a14:useLocalDpi xmlns="" xmlns:a14="http://schemas.microsoft.com/office/drawing/2010/main" val="0"/>
               </a:ext>
             </a:extLst>
           </a:blip>
@@ -6968,7 +6964,7 @@
     </p:spTree>
     <p:extLst>
       <p:ext uri="{BB962C8B-B14F-4D97-AF65-F5344CB8AC3E}">
-        <p14:creationId xmlns:p14="http://schemas.microsoft.com/office/powerpoint/2010/main" xmlns="" val="4136420094"/>
+        <p14:creationId xmlns="" xmlns:p14="http://schemas.microsoft.com/office/powerpoint/2010/main" val="4136420094"/>
       </p:ext>
     </p:extLst>
   </p:cSld>
@@ -7152,7 +7148,7 @@
     </p:spTree>
     <p:extLst>
       <p:ext uri="{BB962C8B-B14F-4D97-AF65-F5344CB8AC3E}">
-        <p14:creationId xmlns:p14="http://schemas.microsoft.com/office/powerpoint/2010/main" xmlns="" val="529095658"/>
+        <p14:creationId xmlns="" xmlns:p14="http://schemas.microsoft.com/office/powerpoint/2010/main" val="529095658"/>
       </p:ext>
     </p:extLst>
   </p:cSld>
@@ -7237,7 +7233,7 @@
           <a:blip r:embed="rId2" cstate="print">
             <a:extLst>
               <a:ext uri="{28A0092B-C50C-407E-A947-70E740481C1C}">
-                <a14:useLocalDpi xmlns:a14="http://schemas.microsoft.com/office/drawing/2010/main" xmlns="" val="0"/>
+                <a14:useLocalDpi xmlns="" xmlns:a14="http://schemas.microsoft.com/office/drawing/2010/main" val="0"/>
               </a:ext>
             </a:extLst>
           </a:blip>
@@ -7293,7 +7289,7 @@
     </p:spTree>
     <p:extLst>
       <p:ext uri="{BB962C8B-B14F-4D97-AF65-F5344CB8AC3E}">
-        <p14:creationId xmlns:p14="http://schemas.microsoft.com/office/powerpoint/2010/main" xmlns="" val="422123805"/>
+        <p14:creationId xmlns="" xmlns:p14="http://schemas.microsoft.com/office/powerpoint/2010/main" val="422123805"/>
       </p:ext>
     </p:extLst>
   </p:cSld>

</xml_diff>